<commit_message>
Changes to the workflow diagram.
Former-commit-id: 878fd73e4d5f5682b55042385d9aa3fe892e7702
</commit_message>
<xml_diff>
--- a/docs/workflow.pptx
+++ b/docs/workflow.pptx
@@ -104,6 +104,11 @@
       </a:defRPr>
     </a:lvl9pPr>
   </p:defaultTextStyle>
+  <p:extLst>
+    <p:ext uri="{EFAFB233-063F-42B5-8137-9DF3F51BA10A}">
+      <p15:sldGuideLst xmlns:p15="http://schemas.microsoft.com/office/powerpoint/2012/main"/>
+    </p:ext>
+  </p:extLst>
 </p:presentation>
 </file>
 
@@ -238,7 +243,7 @@
           <a:p>
             <a:fld id="{CDFF42DE-5E01-4599-B0B4-9A0F5A7013D0}" type="datetimeFigureOut">
               <a:rPr lang="en-US" smtClean="0"/>
-              <a:t>1/16/2018</a:t>
+              <a:t>1/24/2018</a:t>
             </a:fld>
             <a:endParaRPr lang="en-US"/>
           </a:p>
@@ -408,7 +413,7 @@
           <a:p>
             <a:fld id="{CDFF42DE-5E01-4599-B0B4-9A0F5A7013D0}" type="datetimeFigureOut">
               <a:rPr lang="en-US" smtClean="0"/>
-              <a:t>1/16/2018</a:t>
+              <a:t>1/24/2018</a:t>
             </a:fld>
             <a:endParaRPr lang="en-US"/>
           </a:p>
@@ -588,7 +593,7 @@
           <a:p>
             <a:fld id="{CDFF42DE-5E01-4599-B0B4-9A0F5A7013D0}" type="datetimeFigureOut">
               <a:rPr lang="en-US" smtClean="0"/>
-              <a:t>1/16/2018</a:t>
+              <a:t>1/24/2018</a:t>
             </a:fld>
             <a:endParaRPr lang="en-US"/>
           </a:p>
@@ -758,7 +763,7 @@
           <a:p>
             <a:fld id="{CDFF42DE-5E01-4599-B0B4-9A0F5A7013D0}" type="datetimeFigureOut">
               <a:rPr lang="en-US" smtClean="0"/>
-              <a:t>1/16/2018</a:t>
+              <a:t>1/24/2018</a:t>
             </a:fld>
             <a:endParaRPr lang="en-US"/>
           </a:p>
@@ -1004,7 +1009,7 @@
           <a:p>
             <a:fld id="{CDFF42DE-5E01-4599-B0B4-9A0F5A7013D0}" type="datetimeFigureOut">
               <a:rPr lang="en-US" smtClean="0"/>
-              <a:t>1/16/2018</a:t>
+              <a:t>1/24/2018</a:t>
             </a:fld>
             <a:endParaRPr lang="en-US"/>
           </a:p>
@@ -1236,7 +1241,7 @@
           <a:p>
             <a:fld id="{CDFF42DE-5E01-4599-B0B4-9A0F5A7013D0}" type="datetimeFigureOut">
               <a:rPr lang="en-US" smtClean="0"/>
-              <a:t>1/16/2018</a:t>
+              <a:t>1/24/2018</a:t>
             </a:fld>
             <a:endParaRPr lang="en-US"/>
           </a:p>
@@ -1603,7 +1608,7 @@
           <a:p>
             <a:fld id="{CDFF42DE-5E01-4599-B0B4-9A0F5A7013D0}" type="datetimeFigureOut">
               <a:rPr lang="en-US" smtClean="0"/>
-              <a:t>1/16/2018</a:t>
+              <a:t>1/24/2018</a:t>
             </a:fld>
             <a:endParaRPr lang="en-US"/>
           </a:p>
@@ -1721,7 +1726,7 @@
           <a:p>
             <a:fld id="{CDFF42DE-5E01-4599-B0B4-9A0F5A7013D0}" type="datetimeFigureOut">
               <a:rPr lang="en-US" smtClean="0"/>
-              <a:t>1/16/2018</a:t>
+              <a:t>1/24/2018</a:t>
             </a:fld>
             <a:endParaRPr lang="en-US"/>
           </a:p>
@@ -1816,7 +1821,7 @@
           <a:p>
             <a:fld id="{CDFF42DE-5E01-4599-B0B4-9A0F5A7013D0}" type="datetimeFigureOut">
               <a:rPr lang="en-US" smtClean="0"/>
-              <a:t>1/16/2018</a:t>
+              <a:t>1/24/2018</a:t>
             </a:fld>
             <a:endParaRPr lang="en-US"/>
           </a:p>
@@ -2093,7 +2098,7 @@
           <a:p>
             <a:fld id="{CDFF42DE-5E01-4599-B0B4-9A0F5A7013D0}" type="datetimeFigureOut">
               <a:rPr lang="en-US" smtClean="0"/>
-              <a:t>1/16/2018</a:t>
+              <a:t>1/24/2018</a:t>
             </a:fld>
             <a:endParaRPr lang="en-US"/>
           </a:p>
@@ -2346,7 +2351,7 @@
           <a:p>
             <a:fld id="{CDFF42DE-5E01-4599-B0B4-9A0F5A7013D0}" type="datetimeFigureOut">
               <a:rPr lang="en-US" smtClean="0"/>
-              <a:t>1/16/2018</a:t>
+              <a:t>1/24/2018</a:t>
             </a:fld>
             <a:endParaRPr lang="en-US"/>
           </a:p>
@@ -2559,7 +2564,7 @@
           <a:p>
             <a:fld id="{CDFF42DE-5E01-4599-B0B4-9A0F5A7013D0}" type="datetimeFigureOut">
               <a:rPr lang="en-US" smtClean="0"/>
-              <a:t>1/16/2018</a:t>
+              <a:t>1/24/2018</a:t>
             </a:fld>
             <a:endParaRPr lang="en-US"/>
           </a:p>
@@ -2972,8 +2977,8 @@
         </p:nvSpPr>
         <p:spPr>
           <a:xfrm>
-            <a:off x="498763" y="2828059"/>
-            <a:ext cx="1537855" cy="872836"/>
+            <a:off x="498764" y="2942389"/>
+            <a:ext cx="1351422" cy="758505"/>
           </a:xfrm>
           <a:prstGeom prst="rect">
             <a:avLst/>
@@ -3001,7 +3006,7 @@
           <a:p>
             <a:pPr algn="ctr"/>
             <a:r>
-              <a:rPr lang="en-US" dirty="0" smtClean="0"/>
+              <a:rPr lang="en-US" sz="1400" dirty="0" smtClean="0"/>
               <a:t>Parameter combination generation   </a:t>
             </a:r>
           </a:p>
@@ -3015,8 +3020,8 @@
         </p:nvSpPr>
         <p:spPr>
           <a:xfrm>
-            <a:off x="2247902" y="2828059"/>
-            <a:ext cx="1537855" cy="872836"/>
+            <a:off x="2247903" y="2942389"/>
+            <a:ext cx="1351422" cy="758505"/>
           </a:xfrm>
           <a:prstGeom prst="rect">
             <a:avLst/>
@@ -3044,7 +3049,7 @@
           <a:p>
             <a:pPr algn="ctr"/>
             <a:r>
-              <a:rPr lang="en-US" dirty="0" smtClean="0"/>
+              <a:rPr lang="en-US" sz="1400" dirty="0" smtClean="0"/>
               <a:t>Runs on PIC</a:t>
             </a:r>
           </a:p>
@@ -3058,8 +3063,8 @@
         </p:nvSpPr>
         <p:spPr>
           <a:xfrm>
-            <a:off x="10051474" y="2982191"/>
-            <a:ext cx="1537855" cy="872836"/>
+            <a:off x="10051475" y="3096521"/>
+            <a:ext cx="1351422" cy="758505"/>
           </a:xfrm>
           <a:prstGeom prst="rect">
             <a:avLst/>
@@ -3087,13 +3092,13 @@
           <a:p>
             <a:pPr algn="ctr"/>
             <a:r>
-              <a:rPr lang="en-US" dirty="0" smtClean="0"/>
+              <a:rPr lang="en-US" sz="1400" dirty="0" smtClean="0"/>
               <a:t>filter_flag.csv</a:t>
             </a:r>
           </a:p>
           <a:p>
             <a:pPr algn="ctr"/>
-            <a:endParaRPr lang="en-US" dirty="0" smtClean="0"/>
+            <a:endParaRPr lang="en-US" sz="1400" dirty="0" smtClean="0"/>
           </a:p>
         </p:txBody>
       </p:sp>
@@ -3105,8 +3110,8 @@
         </p:nvSpPr>
         <p:spPr>
           <a:xfrm>
-            <a:off x="6175667" y="214745"/>
-            <a:ext cx="2466109" cy="1884219"/>
+            <a:off x="6175668" y="174173"/>
+            <a:ext cx="2167144" cy="1637410"/>
           </a:xfrm>
           <a:prstGeom prst="rect">
             <a:avLst/>
@@ -3133,7 +3138,7 @@
           <a:lstStyle/>
           <a:p>
             <a:pPr algn="ctr"/>
-            <a:endParaRPr lang="en-US" dirty="0" smtClean="0"/>
+            <a:endParaRPr lang="en-US" sz="1400" dirty="0" smtClean="0"/>
           </a:p>
         </p:txBody>
       </p:sp>
@@ -3145,12 +3150,15 @@
         </p:nvSpPr>
         <p:spPr>
           <a:xfrm>
-            <a:off x="6587836" y="290946"/>
-            <a:ext cx="1433945" cy="290945"/>
+            <a:off x="6587836" y="41675"/>
+            <a:ext cx="1260109" cy="252835"/>
           </a:xfrm>
           <a:prstGeom prst="rect">
             <a:avLst/>
           </a:prstGeom>
+          <a:ln>
+            <a:noFill/>
+          </a:ln>
         </p:spPr>
         <p:style>
           <a:lnRef idx="2">
@@ -3174,14 +3182,14 @@
           <a:p>
             <a:pPr algn="ctr"/>
             <a:r>
-              <a:rPr lang="en-US" dirty="0" err="1" smtClean="0"/>
+              <a:rPr lang="en-US" sz="1400" b="1" i="1" dirty="0" err="1" smtClean="0"/>
               <a:t>Tgav</a:t>
             </a:r>
             <a:r>
-              <a:rPr lang="en-US" dirty="0" smtClean="0"/>
+              <a:rPr lang="en-US" sz="1400" b="1" i="1" dirty="0" smtClean="0"/>
               <a:t> filter</a:t>
             </a:r>
-            <a:endParaRPr lang="en-US" dirty="0"/>
+            <a:endParaRPr lang="en-US" sz="1400" b="1" i="1" dirty="0"/>
           </a:p>
         </p:txBody>
       </p:sp>
@@ -3193,8 +3201,8 @@
         </p:nvSpPr>
         <p:spPr>
           <a:xfrm>
-            <a:off x="6289967" y="753341"/>
-            <a:ext cx="2192482" cy="290945"/>
+            <a:off x="6289967" y="504070"/>
+            <a:ext cx="1926689" cy="252835"/>
           </a:xfrm>
           <a:prstGeom prst="rect">
             <a:avLst/>
@@ -3222,10 +3230,10 @@
           <a:p>
             <a:pPr algn="ctr"/>
             <a:r>
-              <a:rPr lang="en-US" dirty="0" smtClean="0"/>
+              <a:rPr lang="en-US" sz="1400" dirty="0" smtClean="0"/>
               <a:t>Process observations</a:t>
             </a:r>
-            <a:endParaRPr lang="en-US" dirty="0"/>
+            <a:endParaRPr lang="en-US" sz="1400" dirty="0"/>
           </a:p>
         </p:txBody>
       </p:sp>
@@ -3237,8 +3245,8 @@
         </p:nvSpPr>
         <p:spPr>
           <a:xfrm>
-            <a:off x="6289967" y="1186296"/>
-            <a:ext cx="2192482" cy="290945"/>
+            <a:off x="6289967" y="937025"/>
+            <a:ext cx="1926689" cy="252835"/>
           </a:xfrm>
           <a:prstGeom prst="rect">
             <a:avLst/>
@@ -3266,10 +3274,10 @@
           <a:p>
             <a:pPr algn="ctr"/>
             <a:r>
-              <a:rPr lang="en-US" dirty="0" smtClean="0"/>
+              <a:rPr lang="en-US" sz="1400" dirty="0" smtClean="0"/>
               <a:t>Process hector runs</a:t>
             </a:r>
-            <a:endParaRPr lang="en-US" dirty="0"/>
+            <a:endParaRPr lang="en-US" sz="1400" dirty="0"/>
           </a:p>
         </p:txBody>
       </p:sp>
@@ -3281,8 +3289,8 @@
         </p:nvSpPr>
         <p:spPr>
           <a:xfrm>
-            <a:off x="6289967" y="1636569"/>
-            <a:ext cx="2192482" cy="290945"/>
+            <a:off x="6289967" y="1387298"/>
+            <a:ext cx="1926689" cy="252835"/>
           </a:xfrm>
           <a:prstGeom prst="rect">
             <a:avLst/>
@@ -3310,10 +3318,10 @@
           <a:p>
             <a:pPr algn="ctr"/>
             <a:r>
-              <a:rPr lang="en-US" dirty="0" smtClean="0"/>
+              <a:rPr lang="en-US" sz="1400" dirty="0" smtClean="0"/>
               <a:t>Perform filtering</a:t>
             </a:r>
-            <a:endParaRPr lang="en-US" dirty="0"/>
+            <a:endParaRPr lang="en-US" sz="1400" dirty="0"/>
           </a:p>
         </p:txBody>
       </p:sp>
@@ -3325,8 +3333,8 @@
         </p:nvSpPr>
         <p:spPr>
           <a:xfrm>
-            <a:off x="6175667" y="2434936"/>
-            <a:ext cx="2466109" cy="1884219"/>
+            <a:off x="6175668" y="2080857"/>
+            <a:ext cx="2167144" cy="1637410"/>
           </a:xfrm>
           <a:prstGeom prst="rect">
             <a:avLst/>
@@ -3353,7 +3361,7 @@
           <a:lstStyle/>
           <a:p>
             <a:pPr algn="ctr"/>
-            <a:endParaRPr lang="en-US" dirty="0" smtClean="0"/>
+            <a:endParaRPr lang="en-US" sz="1400" dirty="0" smtClean="0"/>
           </a:p>
         </p:txBody>
       </p:sp>
@@ -3365,12 +3373,15 @@
         </p:nvSpPr>
         <p:spPr>
           <a:xfrm>
-            <a:off x="6289968" y="2511137"/>
-            <a:ext cx="2116278" cy="290945"/>
+            <a:off x="6289968" y="1948359"/>
+            <a:ext cx="1859723" cy="252835"/>
           </a:xfrm>
           <a:prstGeom prst="rect">
             <a:avLst/>
           </a:prstGeom>
+          <a:ln>
+            <a:noFill/>
+          </a:ln>
         </p:spPr>
         <p:style>
           <a:lnRef idx="2">
@@ -3394,10 +3405,10 @@
           <a:p>
             <a:pPr algn="ctr"/>
             <a:r>
-              <a:rPr lang="en-US" dirty="0" smtClean="0"/>
+              <a:rPr lang="en-US" sz="1400" b="1" i="1" dirty="0" smtClean="0"/>
               <a:t>Land flux filter</a:t>
             </a:r>
-            <a:endParaRPr lang="en-US" dirty="0"/>
+            <a:endParaRPr lang="en-US" sz="1400" b="1" i="1" dirty="0"/>
           </a:p>
         </p:txBody>
       </p:sp>
@@ -3409,8 +3420,8 @@
         </p:nvSpPr>
         <p:spPr>
           <a:xfrm>
-            <a:off x="6289967" y="2973532"/>
-            <a:ext cx="2192482" cy="290945"/>
+            <a:off x="6289967" y="2410754"/>
+            <a:ext cx="1926689" cy="252835"/>
           </a:xfrm>
           <a:prstGeom prst="rect">
             <a:avLst/>
@@ -3438,10 +3449,10 @@
           <a:p>
             <a:pPr algn="ctr"/>
             <a:r>
-              <a:rPr lang="en-US" dirty="0" smtClean="0"/>
+              <a:rPr lang="en-US" sz="1400" dirty="0" smtClean="0"/>
               <a:t>Process observations</a:t>
             </a:r>
-            <a:endParaRPr lang="en-US" dirty="0"/>
+            <a:endParaRPr lang="en-US" sz="1400" dirty="0"/>
           </a:p>
         </p:txBody>
       </p:sp>
@@ -3453,8 +3464,8 @@
         </p:nvSpPr>
         <p:spPr>
           <a:xfrm>
-            <a:off x="6289967" y="3406487"/>
-            <a:ext cx="2192482" cy="290945"/>
+            <a:off x="6289967" y="2843709"/>
+            <a:ext cx="1926689" cy="252835"/>
           </a:xfrm>
           <a:prstGeom prst="rect">
             <a:avLst/>
@@ -3482,10 +3493,10 @@
           <a:p>
             <a:pPr algn="ctr"/>
             <a:r>
-              <a:rPr lang="en-US" dirty="0" smtClean="0"/>
+              <a:rPr lang="en-US" sz="1400" dirty="0" smtClean="0"/>
               <a:t>Process hector runs</a:t>
             </a:r>
-            <a:endParaRPr lang="en-US" dirty="0"/>
+            <a:endParaRPr lang="en-US" sz="1400" dirty="0"/>
           </a:p>
         </p:txBody>
       </p:sp>
@@ -3497,8 +3508,8 @@
         </p:nvSpPr>
         <p:spPr>
           <a:xfrm>
-            <a:off x="6289967" y="3856760"/>
-            <a:ext cx="2192482" cy="290945"/>
+            <a:off x="6289967" y="3293982"/>
+            <a:ext cx="1926689" cy="252835"/>
           </a:xfrm>
           <a:prstGeom prst="rect">
             <a:avLst/>
@@ -3526,10 +3537,10 @@
           <a:p>
             <a:pPr algn="ctr"/>
             <a:r>
-              <a:rPr lang="en-US" dirty="0" smtClean="0"/>
+              <a:rPr lang="en-US" sz="1400" dirty="0" smtClean="0"/>
               <a:t>Perform filtering</a:t>
             </a:r>
-            <a:endParaRPr lang="en-US" dirty="0"/>
+            <a:endParaRPr lang="en-US" sz="1400" dirty="0"/>
           </a:p>
         </p:txBody>
       </p:sp>
@@ -3541,8 +3552,8 @@
         </p:nvSpPr>
         <p:spPr>
           <a:xfrm>
-            <a:off x="6175667" y="4655127"/>
-            <a:ext cx="2466109" cy="1884219"/>
+            <a:off x="6175668" y="3983263"/>
+            <a:ext cx="2167144" cy="1637410"/>
           </a:xfrm>
           <a:prstGeom prst="rect">
             <a:avLst/>
@@ -3569,7 +3580,7 @@
           <a:lstStyle/>
           <a:p>
             <a:pPr algn="ctr"/>
-            <a:endParaRPr lang="en-US" dirty="0" smtClean="0"/>
+            <a:endParaRPr lang="en-US" sz="1400" dirty="0" smtClean="0"/>
           </a:p>
         </p:txBody>
       </p:sp>
@@ -3581,12 +3592,15 @@
         </p:nvSpPr>
         <p:spPr>
           <a:xfrm>
-            <a:off x="6289968" y="4731328"/>
-            <a:ext cx="2116278" cy="290945"/>
+            <a:off x="6289968" y="3850765"/>
+            <a:ext cx="1926688" cy="252835"/>
           </a:xfrm>
           <a:prstGeom prst="rect">
             <a:avLst/>
           </a:prstGeom>
+          <a:ln>
+            <a:noFill/>
+          </a:ln>
         </p:spPr>
         <p:style>
           <a:lnRef idx="2">
@@ -3610,10 +3624,10 @@
           <a:p>
             <a:pPr algn="ctr"/>
             <a:r>
-              <a:rPr lang="en-US" dirty="0" smtClean="0"/>
+              <a:rPr lang="en-US" sz="1400" b="1" i="1" dirty="0" smtClean="0"/>
               <a:t>Carbon growth filter</a:t>
             </a:r>
-            <a:endParaRPr lang="en-US" dirty="0"/>
+            <a:endParaRPr lang="en-US" sz="1400" b="1" i="1" dirty="0"/>
           </a:p>
         </p:txBody>
       </p:sp>
@@ -3625,8 +3639,8 @@
         </p:nvSpPr>
         <p:spPr>
           <a:xfrm>
-            <a:off x="6289967" y="5193723"/>
-            <a:ext cx="2192482" cy="290945"/>
+            <a:off x="6289967" y="4313160"/>
+            <a:ext cx="1926689" cy="252835"/>
           </a:xfrm>
           <a:prstGeom prst="rect">
             <a:avLst/>
@@ -3654,10 +3668,10 @@
           <a:p>
             <a:pPr algn="ctr"/>
             <a:r>
-              <a:rPr lang="en-US" dirty="0" smtClean="0"/>
+              <a:rPr lang="en-US" sz="1400" dirty="0" smtClean="0"/>
               <a:t>Process observations</a:t>
             </a:r>
-            <a:endParaRPr lang="en-US" dirty="0"/>
+            <a:endParaRPr lang="en-US" sz="1400" dirty="0"/>
           </a:p>
         </p:txBody>
       </p:sp>
@@ -3669,8 +3683,8 @@
         </p:nvSpPr>
         <p:spPr>
           <a:xfrm>
-            <a:off x="6289967" y="5626678"/>
-            <a:ext cx="2192482" cy="290945"/>
+            <a:off x="6289967" y="4746115"/>
+            <a:ext cx="1926689" cy="252835"/>
           </a:xfrm>
           <a:prstGeom prst="rect">
             <a:avLst/>
@@ -3698,10 +3712,10 @@
           <a:p>
             <a:pPr algn="ctr"/>
             <a:r>
-              <a:rPr lang="en-US" dirty="0" smtClean="0"/>
+              <a:rPr lang="en-US" sz="1400" dirty="0" smtClean="0"/>
               <a:t>Process hector runs</a:t>
             </a:r>
-            <a:endParaRPr lang="en-US" dirty="0"/>
+            <a:endParaRPr lang="en-US" sz="1400" dirty="0"/>
           </a:p>
         </p:txBody>
       </p:sp>
@@ -3713,8 +3727,8 @@
         </p:nvSpPr>
         <p:spPr>
           <a:xfrm>
-            <a:off x="6289967" y="6076951"/>
-            <a:ext cx="2192482" cy="290945"/>
+            <a:off x="6289967" y="5196388"/>
+            <a:ext cx="1926689" cy="252835"/>
           </a:xfrm>
           <a:prstGeom prst="rect">
             <a:avLst/>
@@ -3742,10 +3756,10 @@
           <a:p>
             <a:pPr algn="ctr"/>
             <a:r>
-              <a:rPr lang="en-US" dirty="0" smtClean="0"/>
+              <a:rPr lang="en-US" sz="1400" dirty="0" smtClean="0"/>
               <a:t>Perform filtering</a:t>
             </a:r>
-            <a:endParaRPr lang="en-US" dirty="0"/>
+            <a:endParaRPr lang="en-US" sz="1400" dirty="0"/>
           </a:p>
         </p:txBody>
       </p:sp>
@@ -3757,8 +3771,8 @@
         </p:nvSpPr>
         <p:spPr>
           <a:xfrm>
-            <a:off x="3997041" y="2828059"/>
-            <a:ext cx="1537855" cy="872836"/>
+            <a:off x="3997042" y="2942389"/>
+            <a:ext cx="1351422" cy="758505"/>
           </a:xfrm>
           <a:prstGeom prst="rect">
             <a:avLst/>
@@ -3786,10 +3800,9 @@
           <a:p>
             <a:pPr algn="ctr"/>
             <a:r>
-              <a:rPr lang="en-US" dirty="0" smtClean="0"/>
+              <a:rPr lang="en-US" sz="1400" dirty="0" smtClean="0"/>
               <a:t>Run results cleanup</a:t>
             </a:r>
-            <a:endParaRPr lang="en-US" dirty="0" smtClean="0"/>
           </a:p>
         </p:txBody>
       </p:sp>
@@ -3804,8 +3817,8 @@
         </p:nvCxnSpPr>
         <p:spPr>
           <a:xfrm>
-            <a:off x="2036618" y="3264477"/>
-            <a:ext cx="211284" cy="0"/>
+            <a:off x="1850186" y="3321642"/>
+            <a:ext cx="397717" cy="0"/>
           </a:xfrm>
           <a:prstGeom prst="straightConnector1">
             <a:avLst/>
@@ -3840,8 +3853,8 @@
         </p:nvCxnSpPr>
         <p:spPr>
           <a:xfrm>
-            <a:off x="3785757" y="3264477"/>
-            <a:ext cx="211284" cy="0"/>
+            <a:off x="3599325" y="3321642"/>
+            <a:ext cx="397717" cy="0"/>
           </a:xfrm>
           <a:prstGeom prst="straightConnector1">
             <a:avLst/>
@@ -3876,8 +3889,8 @@
         </p:nvCxnSpPr>
         <p:spPr>
           <a:xfrm flipV="1">
-            <a:off x="5534896" y="1156855"/>
-            <a:ext cx="640771" cy="2107622"/>
+            <a:off x="5348464" y="992878"/>
+            <a:ext cx="827204" cy="2328764"/>
           </a:xfrm>
           <a:prstGeom prst="straightConnector1">
             <a:avLst/>
@@ -3911,9 +3924,9 @@
           <p:nvPr/>
         </p:nvCxnSpPr>
         <p:spPr>
-          <a:xfrm>
-            <a:off x="5534896" y="3264477"/>
-            <a:ext cx="640771" cy="112569"/>
+          <a:xfrm flipV="1">
+            <a:off x="5348464" y="2899562"/>
+            <a:ext cx="827204" cy="422080"/>
           </a:xfrm>
           <a:prstGeom prst="straightConnector1">
             <a:avLst/>
@@ -3948,8 +3961,8 @@
         </p:nvCxnSpPr>
         <p:spPr>
           <a:xfrm>
-            <a:off x="5534896" y="3264477"/>
-            <a:ext cx="640771" cy="2332760"/>
+            <a:off x="5348464" y="3321642"/>
+            <a:ext cx="827204" cy="1480326"/>
           </a:xfrm>
           <a:prstGeom prst="straightConnector1">
             <a:avLst/>
@@ -3984,8 +3997,8 @@
         </p:nvCxnSpPr>
         <p:spPr>
           <a:xfrm>
-            <a:off x="8641776" y="1156855"/>
-            <a:ext cx="1409698" cy="2261754"/>
+            <a:off x="8342812" y="992878"/>
+            <a:ext cx="1708663" cy="2482896"/>
           </a:xfrm>
           <a:prstGeom prst="straightConnector1">
             <a:avLst/>
@@ -4020,8 +4033,8 @@
         </p:nvCxnSpPr>
         <p:spPr>
           <a:xfrm>
-            <a:off x="8641776" y="3377046"/>
-            <a:ext cx="1409698" cy="41563"/>
+            <a:off x="8342812" y="2899562"/>
+            <a:ext cx="1708663" cy="576212"/>
           </a:xfrm>
           <a:prstGeom prst="straightConnector1">
             <a:avLst/>
@@ -4056,8 +4069,257 @@
         </p:nvCxnSpPr>
         <p:spPr>
           <a:xfrm flipV="1">
-            <a:off x="8641776" y="3418609"/>
-            <a:ext cx="1409698" cy="2178628"/>
+            <a:off x="8342812" y="3475774"/>
+            <a:ext cx="1708663" cy="1326194"/>
+          </a:xfrm>
+          <a:prstGeom prst="straightConnector1">
+            <a:avLst/>
+          </a:prstGeom>
+          <a:ln>
+            <a:tailEnd type="triangle"/>
+          </a:ln>
+        </p:spPr>
+        <p:style>
+          <a:lnRef idx="1">
+            <a:schemeClr val="accent1"/>
+          </a:lnRef>
+          <a:fillRef idx="0">
+            <a:schemeClr val="accent1"/>
+          </a:fillRef>
+          <a:effectRef idx="0">
+            <a:schemeClr val="accent1"/>
+          </a:effectRef>
+          <a:fontRef idx="minor">
+            <a:schemeClr val="tx1"/>
+          </a:fontRef>
+        </p:style>
+      </p:cxnSp>
+      <p:sp>
+        <p:nvSpPr>
+          <p:cNvPr id="3" name="Rectangle 2"/>
+          <p:cNvSpPr/>
+          <p:nvPr/>
+        </p:nvSpPr>
+        <p:spPr>
+          <a:xfrm>
+            <a:off x="302217" y="2757258"/>
+            <a:ext cx="5262559" cy="2869420"/>
+          </a:xfrm>
+          <a:prstGeom prst="rect">
+            <a:avLst/>
+          </a:prstGeom>
+          <a:noFill/>
+          <a:ln>
+            <a:solidFill>
+              <a:schemeClr val="tx1"/>
+            </a:solidFill>
+          </a:ln>
+        </p:spPr>
+        <p:style>
+          <a:lnRef idx="2">
+            <a:schemeClr val="accent1">
+              <a:shade val="50000"/>
+            </a:schemeClr>
+          </a:lnRef>
+          <a:fillRef idx="1">
+            <a:schemeClr val="accent1"/>
+          </a:fillRef>
+          <a:effectRef idx="0">
+            <a:schemeClr val="accent1"/>
+          </a:effectRef>
+          <a:fontRef idx="minor">
+            <a:schemeClr val="lt1"/>
+          </a:fontRef>
+        </p:style>
+        <p:txBody>
+          <a:bodyPr rtlCol="0" anchor="ctr"/>
+          <a:lstStyle/>
+          <a:p>
+            <a:pPr algn="ctr"/>
+            <a:endParaRPr lang="en-US" sz="1400"/>
+          </a:p>
+        </p:txBody>
+      </p:sp>
+      <p:sp>
+        <p:nvSpPr>
+          <p:cNvPr id="43" name="Rectangle 42"/>
+          <p:cNvSpPr/>
+          <p:nvPr/>
+        </p:nvSpPr>
+        <p:spPr>
+          <a:xfrm>
+            <a:off x="6175668" y="5950609"/>
+            <a:ext cx="2167144" cy="824924"/>
+          </a:xfrm>
+          <a:prstGeom prst="rect">
+            <a:avLst/>
+          </a:prstGeom>
+        </p:spPr>
+        <p:style>
+          <a:lnRef idx="2">
+            <a:schemeClr val="accent1">
+              <a:shade val="50000"/>
+            </a:schemeClr>
+          </a:lnRef>
+          <a:fillRef idx="1">
+            <a:schemeClr val="accent1"/>
+          </a:fillRef>
+          <a:effectRef idx="0">
+            <a:schemeClr val="accent1"/>
+          </a:effectRef>
+          <a:fontRef idx="minor">
+            <a:schemeClr val="lt1"/>
+          </a:fontRef>
+        </p:style>
+        <p:txBody>
+          <a:bodyPr rtlCol="0" anchor="ctr"/>
+          <a:lstStyle/>
+          <a:p>
+            <a:pPr algn="ctr"/>
+            <a:endParaRPr lang="en-US" sz="1400" dirty="0" smtClean="0"/>
+          </a:p>
+        </p:txBody>
+      </p:sp>
+      <p:sp>
+        <p:nvSpPr>
+          <p:cNvPr id="44" name="Rectangle 43"/>
+          <p:cNvSpPr/>
+          <p:nvPr/>
+        </p:nvSpPr>
+        <p:spPr>
+          <a:xfrm>
+            <a:off x="6333513" y="5818111"/>
+            <a:ext cx="1859723" cy="252835"/>
+          </a:xfrm>
+          <a:prstGeom prst="rect">
+            <a:avLst/>
+          </a:prstGeom>
+          <a:ln>
+            <a:noFill/>
+          </a:ln>
+        </p:spPr>
+        <p:style>
+          <a:lnRef idx="2">
+            <a:schemeClr val="accent1">
+              <a:shade val="50000"/>
+            </a:schemeClr>
+          </a:lnRef>
+          <a:fillRef idx="1">
+            <a:schemeClr val="accent1"/>
+          </a:fillRef>
+          <a:effectRef idx="0">
+            <a:schemeClr val="accent1"/>
+          </a:effectRef>
+          <a:fontRef idx="minor">
+            <a:schemeClr val="lt1"/>
+          </a:fontRef>
+        </p:style>
+        <p:txBody>
+          <a:bodyPr rtlCol="0" anchor="ctr"/>
+          <a:lstStyle/>
+          <a:p>
+            <a:pPr algn="ctr"/>
+            <a:r>
+              <a:rPr lang="en-US" sz="1400" b="1" i="1" dirty="0" smtClean="0"/>
+              <a:t>Many other filters</a:t>
+            </a:r>
+            <a:endParaRPr lang="en-US" sz="1400" b="1" i="1" dirty="0"/>
+          </a:p>
+        </p:txBody>
+      </p:sp>
+      <p:sp>
+        <p:nvSpPr>
+          <p:cNvPr id="46" name="Rectangle 45"/>
+          <p:cNvSpPr/>
+          <p:nvPr/>
+        </p:nvSpPr>
+        <p:spPr>
+          <a:xfrm>
+            <a:off x="6283386" y="6245986"/>
+            <a:ext cx="1926689" cy="252835"/>
+          </a:xfrm>
+          <a:prstGeom prst="rect">
+            <a:avLst/>
+          </a:prstGeom>
+        </p:spPr>
+        <p:style>
+          <a:lnRef idx="2">
+            <a:schemeClr val="accent1">
+              <a:shade val="50000"/>
+            </a:schemeClr>
+          </a:lnRef>
+          <a:fillRef idx="1">
+            <a:schemeClr val="accent1"/>
+          </a:fillRef>
+          <a:effectRef idx="0">
+            <a:schemeClr val="accent1"/>
+          </a:effectRef>
+          <a:fontRef idx="minor">
+            <a:schemeClr val="lt1"/>
+          </a:fontRef>
+        </p:style>
+        <p:txBody>
+          <a:bodyPr rtlCol="0" anchor="ctr"/>
+          <a:lstStyle/>
+          <a:p>
+            <a:pPr algn="ctr"/>
+            <a:r>
+              <a:rPr lang="en-US" sz="1400" b="1" dirty="0" smtClean="0"/>
+              <a:t>…</a:t>
+            </a:r>
+            <a:endParaRPr lang="en-US" sz="1400" b="1" dirty="0"/>
+          </a:p>
+        </p:txBody>
+      </p:sp>
+      <p:cxnSp>
+        <p:nvCxnSpPr>
+          <p:cNvPr id="27" name="Straight Arrow Connector 26"/>
+          <p:cNvCxnSpPr>
+            <a:stCxn id="26" idx="3"/>
+            <a:endCxn id="43" idx="1"/>
+          </p:cNvCxnSpPr>
+          <p:nvPr/>
+        </p:nvCxnSpPr>
+        <p:spPr>
+          <a:xfrm>
+            <a:off x="5348464" y="3321642"/>
+            <a:ext cx="827204" cy="3041429"/>
+          </a:xfrm>
+          <a:prstGeom prst="straightConnector1">
+            <a:avLst/>
+          </a:prstGeom>
+          <a:ln>
+            <a:tailEnd type="triangle"/>
+          </a:ln>
+        </p:spPr>
+        <p:style>
+          <a:lnRef idx="1">
+            <a:schemeClr val="accent1"/>
+          </a:lnRef>
+          <a:fillRef idx="0">
+            <a:schemeClr val="accent1"/>
+          </a:fillRef>
+          <a:effectRef idx="0">
+            <a:schemeClr val="accent1"/>
+          </a:effectRef>
+          <a:fontRef idx="minor">
+            <a:schemeClr val="tx1"/>
+          </a:fontRef>
+        </p:style>
+      </p:cxnSp>
+      <p:cxnSp>
+        <p:nvCxnSpPr>
+          <p:cNvPr id="31" name="Straight Arrow Connector 30"/>
+          <p:cNvCxnSpPr>
+            <a:stCxn id="43" idx="3"/>
+            <a:endCxn id="7" idx="1"/>
+          </p:cNvCxnSpPr>
+          <p:nvPr/>
+        </p:nvCxnSpPr>
+        <p:spPr>
+          <a:xfrm flipV="1">
+            <a:off x="8342812" y="3475774"/>
+            <a:ext cx="1708663" cy="2887297"/>
           </a:xfrm>
           <a:prstGeom prst="straightConnector1">
             <a:avLst/>

</xml_diff>

<commit_message>
Update work flow chart to refect current work flow
Former-commit-id: 4f79b7b8b8a14f9446819fd1cc7144c4fd3b9394 [formerly 9f778a91291686697fee267b5083fde5ded9a33a]
Former-commit-id: e05f45a7e002d91f19ca5040333462001bafb678
</commit_message>
<xml_diff>
--- a/docs/workflow.pptx
+++ b/docs/workflow.pptx
@@ -243,7 +243,7 @@
           <a:p>
             <a:fld id="{CDFF42DE-5E01-4599-B0B4-9A0F5A7013D0}" type="datetimeFigureOut">
               <a:rPr lang="en-US" smtClean="0"/>
-              <a:t>1/24/2018</a:t>
+              <a:t>3/15/2018</a:t>
             </a:fld>
             <a:endParaRPr lang="en-US"/>
           </a:p>
@@ -413,7 +413,7 @@
           <a:p>
             <a:fld id="{CDFF42DE-5E01-4599-B0B4-9A0F5A7013D0}" type="datetimeFigureOut">
               <a:rPr lang="en-US" smtClean="0"/>
-              <a:t>1/24/2018</a:t>
+              <a:t>3/15/2018</a:t>
             </a:fld>
             <a:endParaRPr lang="en-US"/>
           </a:p>
@@ -593,7 +593,7 @@
           <a:p>
             <a:fld id="{CDFF42DE-5E01-4599-B0B4-9A0F5A7013D0}" type="datetimeFigureOut">
               <a:rPr lang="en-US" smtClean="0"/>
-              <a:t>1/24/2018</a:t>
+              <a:t>3/15/2018</a:t>
             </a:fld>
             <a:endParaRPr lang="en-US"/>
           </a:p>
@@ -763,7 +763,7 @@
           <a:p>
             <a:fld id="{CDFF42DE-5E01-4599-B0B4-9A0F5A7013D0}" type="datetimeFigureOut">
               <a:rPr lang="en-US" smtClean="0"/>
-              <a:t>1/24/2018</a:t>
+              <a:t>3/15/2018</a:t>
             </a:fld>
             <a:endParaRPr lang="en-US"/>
           </a:p>
@@ -1009,7 +1009,7 @@
           <a:p>
             <a:fld id="{CDFF42DE-5E01-4599-B0B4-9A0F5A7013D0}" type="datetimeFigureOut">
               <a:rPr lang="en-US" smtClean="0"/>
-              <a:t>1/24/2018</a:t>
+              <a:t>3/15/2018</a:t>
             </a:fld>
             <a:endParaRPr lang="en-US"/>
           </a:p>
@@ -1241,7 +1241,7 @@
           <a:p>
             <a:fld id="{CDFF42DE-5E01-4599-B0B4-9A0F5A7013D0}" type="datetimeFigureOut">
               <a:rPr lang="en-US" smtClean="0"/>
-              <a:t>1/24/2018</a:t>
+              <a:t>3/15/2018</a:t>
             </a:fld>
             <a:endParaRPr lang="en-US"/>
           </a:p>
@@ -1608,7 +1608,7 @@
           <a:p>
             <a:fld id="{CDFF42DE-5E01-4599-B0B4-9A0F5A7013D0}" type="datetimeFigureOut">
               <a:rPr lang="en-US" smtClean="0"/>
-              <a:t>1/24/2018</a:t>
+              <a:t>3/15/2018</a:t>
             </a:fld>
             <a:endParaRPr lang="en-US"/>
           </a:p>
@@ -1726,7 +1726,7 @@
           <a:p>
             <a:fld id="{CDFF42DE-5E01-4599-B0B4-9A0F5A7013D0}" type="datetimeFigureOut">
               <a:rPr lang="en-US" smtClean="0"/>
-              <a:t>1/24/2018</a:t>
+              <a:t>3/15/2018</a:t>
             </a:fld>
             <a:endParaRPr lang="en-US"/>
           </a:p>
@@ -1821,7 +1821,7 @@
           <a:p>
             <a:fld id="{CDFF42DE-5E01-4599-B0B4-9A0F5A7013D0}" type="datetimeFigureOut">
               <a:rPr lang="en-US" smtClean="0"/>
-              <a:t>1/24/2018</a:t>
+              <a:t>3/15/2018</a:t>
             </a:fld>
             <a:endParaRPr lang="en-US"/>
           </a:p>
@@ -2098,7 +2098,7 @@
           <a:p>
             <a:fld id="{CDFF42DE-5E01-4599-B0B4-9A0F5A7013D0}" type="datetimeFigureOut">
               <a:rPr lang="en-US" smtClean="0"/>
-              <a:t>1/24/2018</a:t>
+              <a:t>3/15/2018</a:t>
             </a:fld>
             <a:endParaRPr lang="en-US"/>
           </a:p>
@@ -2351,7 +2351,7 @@
           <a:p>
             <a:fld id="{CDFF42DE-5E01-4599-B0B4-9A0F5A7013D0}" type="datetimeFigureOut">
               <a:rPr lang="en-US" smtClean="0"/>
-              <a:t>1/24/2018</a:t>
+              <a:t>3/15/2018</a:t>
             </a:fld>
             <a:endParaRPr lang="en-US"/>
           </a:p>
@@ -2564,7 +2564,7 @@
           <a:p>
             <a:fld id="{CDFF42DE-5E01-4599-B0B4-9A0F5A7013D0}" type="datetimeFigureOut">
               <a:rPr lang="en-US" smtClean="0"/>
-              <a:t>1/24/2018</a:t>
+              <a:t>3/15/2018</a:t>
             </a:fld>
             <a:endParaRPr lang="en-US"/>
           </a:p>
@@ -4096,52 +4096,6 @@
       </p:cxnSp>
       <p:sp>
         <p:nvSpPr>
-          <p:cNvPr id="3" name="Rectangle 2"/>
-          <p:cNvSpPr/>
-          <p:nvPr/>
-        </p:nvSpPr>
-        <p:spPr>
-          <a:xfrm>
-            <a:off x="302217" y="2757258"/>
-            <a:ext cx="5262559" cy="2869420"/>
-          </a:xfrm>
-          <a:prstGeom prst="rect">
-            <a:avLst/>
-          </a:prstGeom>
-          <a:noFill/>
-          <a:ln>
-            <a:solidFill>
-              <a:schemeClr val="tx1"/>
-            </a:solidFill>
-          </a:ln>
-        </p:spPr>
-        <p:style>
-          <a:lnRef idx="2">
-            <a:schemeClr val="accent1">
-              <a:shade val="50000"/>
-            </a:schemeClr>
-          </a:lnRef>
-          <a:fillRef idx="1">
-            <a:schemeClr val="accent1"/>
-          </a:fillRef>
-          <a:effectRef idx="0">
-            <a:schemeClr val="accent1"/>
-          </a:effectRef>
-          <a:fontRef idx="minor">
-            <a:schemeClr val="lt1"/>
-          </a:fontRef>
-        </p:style>
-        <p:txBody>
-          <a:bodyPr rtlCol="0" anchor="ctr"/>
-          <a:lstStyle/>
-          <a:p>
-            <a:pPr algn="ctr"/>
-            <a:endParaRPr lang="en-US" sz="1400"/>
-          </a:p>
-        </p:txBody>
-      </p:sp>
-      <p:sp>
-        <p:nvSpPr>
           <p:cNvPr id="43" name="Rectangle 42"/>
           <p:cNvSpPr/>
           <p:nvPr/>
@@ -4343,6 +4297,341 @@
           </a:fontRef>
         </p:style>
       </p:cxnSp>
+      <p:sp>
+        <p:nvSpPr>
+          <p:cNvPr id="35" name="Rectangle 34"/>
+          <p:cNvSpPr/>
+          <p:nvPr/>
+        </p:nvSpPr>
+        <p:spPr>
+          <a:xfrm>
+            <a:off x="16682453" y="3031192"/>
+            <a:ext cx="1351422" cy="758505"/>
+          </a:xfrm>
+          <a:prstGeom prst="rect">
+            <a:avLst/>
+          </a:prstGeom>
+        </p:spPr>
+        <p:style>
+          <a:lnRef idx="2">
+            <a:schemeClr val="accent1">
+              <a:shade val="50000"/>
+            </a:schemeClr>
+          </a:lnRef>
+          <a:fillRef idx="1">
+            <a:schemeClr val="accent1"/>
+          </a:fillRef>
+          <a:effectRef idx="0">
+            <a:schemeClr val="accent1"/>
+          </a:effectRef>
+          <a:fontRef idx="minor">
+            <a:schemeClr val="lt1"/>
+          </a:fontRef>
+        </p:style>
+        <p:txBody>
+          <a:bodyPr rtlCol="0" anchor="ctr"/>
+          <a:lstStyle/>
+          <a:p>
+            <a:pPr algn="ctr"/>
+            <a:r>
+              <a:rPr lang="en-US" sz="1400" dirty="0" smtClean="0"/>
+              <a:t>Process hector-gcam results</a:t>
+            </a:r>
+            <a:endParaRPr lang="en-US" sz="1400" dirty="0" smtClean="0"/>
+          </a:p>
+          <a:p>
+            <a:pPr algn="ctr"/>
+            <a:endParaRPr lang="en-US" sz="1400" dirty="0" smtClean="0"/>
+          </a:p>
+        </p:txBody>
+      </p:sp>
+      <p:cxnSp>
+        <p:nvCxnSpPr>
+          <p:cNvPr id="12" name="Straight Connector 11"/>
+          <p:cNvCxnSpPr/>
+          <p:nvPr/>
+        </p:nvCxnSpPr>
+        <p:spPr>
+          <a:xfrm>
+            <a:off x="14329261" y="3418388"/>
+            <a:ext cx="573172" cy="2011"/>
+          </a:xfrm>
+          <a:prstGeom prst="line">
+            <a:avLst/>
+          </a:prstGeom>
+        </p:spPr>
+        <p:style>
+          <a:lnRef idx="1">
+            <a:schemeClr val="accent1"/>
+          </a:lnRef>
+          <a:fillRef idx="0">
+            <a:schemeClr val="accent1"/>
+          </a:fillRef>
+          <a:effectRef idx="0">
+            <a:schemeClr val="accent1"/>
+          </a:effectRef>
+          <a:fontRef idx="minor">
+            <a:schemeClr val="tx1"/>
+          </a:fontRef>
+        </p:style>
+      </p:cxnSp>
+      <p:cxnSp>
+        <p:nvCxnSpPr>
+          <p:cNvPr id="29" name="Straight Connector 28"/>
+          <p:cNvCxnSpPr>
+            <a:stCxn id="7" idx="3"/>
+          </p:cNvCxnSpPr>
+          <p:nvPr/>
+        </p:nvCxnSpPr>
+        <p:spPr>
+          <a:xfrm>
+            <a:off x="11402897" y="3475774"/>
+            <a:ext cx="573172" cy="0"/>
+          </a:xfrm>
+          <a:prstGeom prst="line">
+            <a:avLst/>
+          </a:prstGeom>
+        </p:spPr>
+        <p:style>
+          <a:lnRef idx="1">
+            <a:schemeClr val="accent1"/>
+          </a:lnRef>
+          <a:fillRef idx="0">
+            <a:schemeClr val="accent1"/>
+          </a:fillRef>
+          <a:effectRef idx="0">
+            <a:schemeClr val="accent1"/>
+          </a:effectRef>
+          <a:fontRef idx="minor">
+            <a:schemeClr val="tx1"/>
+          </a:fontRef>
+        </p:style>
+      </p:cxnSp>
+      <p:cxnSp>
+        <p:nvCxnSpPr>
+          <p:cNvPr id="39" name="Straight Connector 38"/>
+          <p:cNvCxnSpPr/>
+          <p:nvPr/>
+        </p:nvCxnSpPr>
+        <p:spPr>
+          <a:xfrm>
+            <a:off x="16253855" y="3410445"/>
+            <a:ext cx="431862" cy="0"/>
+          </a:xfrm>
+          <a:prstGeom prst="line">
+            <a:avLst/>
+          </a:prstGeom>
+        </p:spPr>
+        <p:style>
+          <a:lnRef idx="1">
+            <a:schemeClr val="accent1"/>
+          </a:lnRef>
+          <a:fillRef idx="0">
+            <a:schemeClr val="accent1"/>
+          </a:fillRef>
+          <a:effectRef idx="0">
+            <a:schemeClr val="accent1"/>
+          </a:effectRef>
+          <a:fontRef idx="minor">
+            <a:schemeClr val="tx1"/>
+          </a:fontRef>
+        </p:style>
+      </p:cxnSp>
+      <p:sp>
+        <p:nvSpPr>
+          <p:cNvPr id="45" name="Rectangle 44"/>
+          <p:cNvSpPr/>
+          <p:nvPr/>
+        </p:nvSpPr>
+        <p:spPr>
+          <a:xfrm>
+            <a:off x="11976069" y="2782618"/>
+            <a:ext cx="2353192" cy="1386309"/>
+          </a:xfrm>
+          <a:prstGeom prst="rect">
+            <a:avLst/>
+          </a:prstGeom>
+        </p:spPr>
+        <p:style>
+          <a:lnRef idx="2">
+            <a:schemeClr val="accent1">
+              <a:shade val="50000"/>
+            </a:schemeClr>
+          </a:lnRef>
+          <a:fillRef idx="1">
+            <a:schemeClr val="accent1"/>
+          </a:fillRef>
+          <a:effectRef idx="0">
+            <a:schemeClr val="accent1"/>
+          </a:effectRef>
+          <a:fontRef idx="minor">
+            <a:schemeClr val="lt1"/>
+          </a:fontRef>
+        </p:style>
+        <p:txBody>
+          <a:bodyPr rtlCol="0" anchor="ctr"/>
+          <a:lstStyle/>
+          <a:p>
+            <a:pPr algn="ctr"/>
+            <a:r>
+              <a:rPr lang="en-US" sz="1400" dirty="0" smtClean="0"/>
+              <a:t>Select </a:t>
+            </a:r>
+            <a:r>
+              <a:rPr lang="en-US" sz="1400" dirty="0" smtClean="0"/>
+              <a:t>Hector </a:t>
+            </a:r>
+            <a:r>
+              <a:rPr lang="en-US" sz="1400" dirty="0" err="1" smtClean="0"/>
+              <a:t>params</a:t>
+            </a:r>
+            <a:r>
+              <a:rPr lang="en-US" sz="1400" dirty="0" smtClean="0"/>
+              <a:t> to use in Hector GCAM</a:t>
+            </a:r>
+          </a:p>
+          <a:p>
+            <a:pPr algn="ctr"/>
+            <a:endParaRPr lang="en-US" sz="1400" dirty="0" smtClean="0"/>
+          </a:p>
+        </p:txBody>
+      </p:sp>
+      <p:sp>
+        <p:nvSpPr>
+          <p:cNvPr id="48" name="Rectangle 47"/>
+          <p:cNvSpPr/>
+          <p:nvPr/>
+        </p:nvSpPr>
+        <p:spPr>
+          <a:xfrm>
+            <a:off x="14902433" y="2717291"/>
+            <a:ext cx="1351422" cy="1386309"/>
+          </a:xfrm>
+          <a:prstGeom prst="rect">
+            <a:avLst/>
+          </a:prstGeom>
+        </p:spPr>
+        <p:style>
+          <a:lnRef idx="2">
+            <a:schemeClr val="accent1">
+              <a:shade val="50000"/>
+            </a:schemeClr>
+          </a:lnRef>
+          <a:fillRef idx="1">
+            <a:schemeClr val="accent1"/>
+          </a:fillRef>
+          <a:effectRef idx="0">
+            <a:schemeClr val="accent1"/>
+          </a:effectRef>
+          <a:fontRef idx="minor">
+            <a:schemeClr val="lt1"/>
+          </a:fontRef>
+        </p:style>
+        <p:txBody>
+          <a:bodyPr rtlCol="0" anchor="ctr"/>
+          <a:lstStyle/>
+          <a:p>
+            <a:pPr algn="ctr"/>
+            <a:r>
+              <a:rPr lang="en-US" sz="1400" dirty="0" smtClean="0"/>
+              <a:t>Set up and run GCAM with new hector </a:t>
+            </a:r>
+            <a:r>
+              <a:rPr lang="en-US" sz="1400" dirty="0" err="1" smtClean="0"/>
+              <a:t>inis</a:t>
+            </a:r>
+            <a:endParaRPr lang="en-US" sz="1400" dirty="0" smtClean="0"/>
+          </a:p>
+        </p:txBody>
+      </p:sp>
+      <p:sp>
+        <p:nvSpPr>
+          <p:cNvPr id="2" name="Rectangle 1"/>
+          <p:cNvSpPr/>
+          <p:nvPr/>
+        </p:nvSpPr>
+        <p:spPr>
+          <a:xfrm>
+            <a:off x="498763" y="-783561"/>
+            <a:ext cx="10904133" cy="495300"/>
+          </a:xfrm>
+          <a:prstGeom prst="rect">
+            <a:avLst/>
+          </a:prstGeom>
+        </p:spPr>
+        <p:style>
+          <a:lnRef idx="2">
+            <a:schemeClr val="accent1">
+              <a:shade val="50000"/>
+            </a:schemeClr>
+          </a:lnRef>
+          <a:fillRef idx="1">
+            <a:schemeClr val="accent1"/>
+          </a:fillRef>
+          <a:effectRef idx="0">
+            <a:schemeClr val="accent1"/>
+          </a:effectRef>
+          <a:fontRef idx="minor">
+            <a:schemeClr val="lt1"/>
+          </a:fontRef>
+        </p:style>
+        <p:txBody>
+          <a:bodyPr rtlCol="0" anchor="ctr"/>
+          <a:lstStyle/>
+          <a:p>
+            <a:pPr algn="ctr"/>
+            <a:r>
+              <a:rPr lang="en-US" dirty="0" smtClean="0"/>
+              <a:t>Part 1 : stand alone hector</a:t>
+            </a:r>
+            <a:endParaRPr lang="en-US" dirty="0"/>
+          </a:p>
+        </p:txBody>
+      </p:sp>
+      <p:sp>
+        <p:nvSpPr>
+          <p:cNvPr id="49" name="Rectangle 48"/>
+          <p:cNvSpPr/>
+          <p:nvPr/>
+        </p:nvSpPr>
+        <p:spPr>
+          <a:xfrm>
+            <a:off x="11976069" y="-783561"/>
+            <a:ext cx="10904133" cy="495300"/>
+          </a:xfrm>
+          <a:prstGeom prst="rect">
+            <a:avLst/>
+          </a:prstGeom>
+        </p:spPr>
+        <p:style>
+          <a:lnRef idx="2">
+            <a:schemeClr val="accent1">
+              <a:shade val="50000"/>
+            </a:schemeClr>
+          </a:lnRef>
+          <a:fillRef idx="1">
+            <a:schemeClr val="accent1"/>
+          </a:fillRef>
+          <a:effectRef idx="0">
+            <a:schemeClr val="accent1"/>
+          </a:effectRef>
+          <a:fontRef idx="minor">
+            <a:schemeClr val="lt1"/>
+          </a:fontRef>
+        </p:style>
+        <p:txBody>
+          <a:bodyPr rtlCol="0" anchor="ctr"/>
+          <a:lstStyle/>
+          <a:p>
+            <a:pPr algn="ctr"/>
+            <a:r>
+              <a:rPr lang="en-US" dirty="0" smtClean="0"/>
+              <a:t>Part 2 : hector-gcam</a:t>
+            </a:r>
+            <a:endParaRPr lang="en-US" dirty="0"/>
+          </a:p>
+        </p:txBody>
+      </p:sp>
     </p:spTree>
     <p:extLst>
       <p:ext uri="{BB962C8B-B14F-4D97-AF65-F5344CB8AC3E}">

</xml_diff>